<commit_message>
Update ms learn slide deck for vslive mshq
</commit_message>
<xml_diff>
--- a/2024/0806_VSLiveRedmond/ContributeToMsLearn/VSLMSHQ24_Become a MS Learn Contributor_AlvinAshcraft.pptx
+++ b/2024/0806_VSLiveRedmond/ContributeToMsLearn/VSLMSHQ24_Become a MS Learn Contributor_AlvinAshcraft.pptx
@@ -612,7 +612,21 @@
                 <a:latin typeface="Calibri"/>
                 <a:cs typeface="Calibri"/>
               </a:rPr>
-              <a:t>Welcome to this session on contributing to the documentation on Microsoft Learn.</a:t>
+              <a:t>Welcome to this </a:t>
+            </a:r>
+            <a:r>
+              <a:rPr lang="en-US" sz="1200">
+                <a:latin typeface="Calibri"/>
+                <a:cs typeface="Calibri"/>
+              </a:rPr>
+              <a:t>Fast Focus </a:t>
+            </a:r>
+            <a:r>
+              <a:rPr lang="en-US" sz="1200" dirty="0">
+                <a:latin typeface="Calibri"/>
+                <a:cs typeface="Calibri"/>
+              </a:rPr>
+              <a:t>session on contributing to the documentation on Microsoft Learn.</a:t>
             </a:r>
           </a:p>
           <a:p>
@@ -4107,7 +4121,7 @@
                 <a:latin typeface="Calibri"/>
                 <a:cs typeface="Calibri"/>
               </a:rPr>
-              <a:t>We’ll try to leave some time at the end for some Q&amp;A, but feel free to ask questions as we go along.</a:t>
+              <a:t>We’ll try to leave some time at the end for some Q&amp;A, but feel free to ask questions as we go along. If we get through things really quickly, I’ll also show you how we work on docs with VS Code and some of the extensions we use.</a:t>
             </a:r>
           </a:p>
         </p:txBody>
@@ -5408,7 +5422,7 @@
           <a:p>
             <a:fld id="{D088F999-7A4E-6B4F-9FED-EF75B73AD044}" type="datetimeFigureOut">
               <a:rPr lang="en-US" smtClean="0"/>
-              <a:t>7/13/2024</a:t>
+              <a:t>8/7/2024</a:t>
             </a:fld>
             <a:endParaRPr lang="en-US"/>
           </a:p>
@@ -5576,7 +5590,7 @@
           <a:p>
             <a:fld id="{D088F999-7A4E-6B4F-9FED-EF75B73AD044}" type="datetimeFigureOut">
               <a:rPr lang="en-US" smtClean="0"/>
-              <a:t>7/13/2024</a:t>
+              <a:t>8/7/2024</a:t>
             </a:fld>
             <a:endParaRPr lang="en-US"/>
           </a:p>
@@ -5754,7 +5768,7 @@
           <a:p>
             <a:fld id="{D088F999-7A4E-6B4F-9FED-EF75B73AD044}" type="datetimeFigureOut">
               <a:rPr lang="en-US" smtClean="0"/>
-              <a:t>7/13/2024</a:t>
+              <a:t>8/7/2024</a:t>
             </a:fld>
             <a:endParaRPr lang="en-US"/>
           </a:p>
@@ -5923,7 +5937,7 @@
             <a:fld id="{3FE51E94-D08C-431E-88FC-7EB62E529A19}" type="datetimeFigureOut">
               <a:rPr lang="en-US" smtClean="0"/>
               <a:pPr/>
-              <a:t>7/13/2024</a:t>
+              <a:t>8/7/2024</a:t>
             </a:fld>
             <a:endParaRPr lang="en-US"/>
           </a:p>
@@ -6092,7 +6106,7 @@
           <a:p>
             <a:fld id="{D088F999-7A4E-6B4F-9FED-EF75B73AD044}" type="datetimeFigureOut">
               <a:rPr lang="en-US" smtClean="0"/>
-              <a:t>7/13/2024</a:t>
+              <a:t>8/7/2024</a:t>
             </a:fld>
             <a:endParaRPr lang="en-US"/>
           </a:p>
@@ -6337,7 +6351,7 @@
           <a:p>
             <a:fld id="{D088F999-7A4E-6B4F-9FED-EF75B73AD044}" type="datetimeFigureOut">
               <a:rPr lang="en-US" smtClean="0"/>
-              <a:t>7/13/2024</a:t>
+              <a:t>8/7/2024</a:t>
             </a:fld>
             <a:endParaRPr lang="en-US"/>
           </a:p>
@@ -6622,7 +6636,7 @@
           <a:p>
             <a:fld id="{D088F999-7A4E-6B4F-9FED-EF75B73AD044}" type="datetimeFigureOut">
               <a:rPr lang="en-US" smtClean="0"/>
-              <a:t>7/13/2024</a:t>
+              <a:t>8/7/2024</a:t>
             </a:fld>
             <a:endParaRPr lang="en-US"/>
           </a:p>
@@ -7041,7 +7055,7 @@
           <a:p>
             <a:fld id="{D088F999-7A4E-6B4F-9FED-EF75B73AD044}" type="datetimeFigureOut">
               <a:rPr lang="en-US" smtClean="0"/>
-              <a:t>7/13/2024</a:t>
+              <a:t>8/7/2024</a:t>
             </a:fld>
             <a:endParaRPr lang="en-US"/>
           </a:p>
@@ -7158,7 +7172,7 @@
           <a:p>
             <a:fld id="{D088F999-7A4E-6B4F-9FED-EF75B73AD044}" type="datetimeFigureOut">
               <a:rPr lang="en-US" smtClean="0"/>
-              <a:t>7/13/2024</a:t>
+              <a:t>8/7/2024</a:t>
             </a:fld>
             <a:endParaRPr lang="en-US"/>
           </a:p>
@@ -7253,7 +7267,7 @@
           <a:p>
             <a:fld id="{D088F999-7A4E-6B4F-9FED-EF75B73AD044}" type="datetimeFigureOut">
               <a:rPr lang="en-US" smtClean="0"/>
-              <a:t>7/13/2024</a:t>
+              <a:t>8/7/2024</a:t>
             </a:fld>
             <a:endParaRPr lang="en-US"/>
           </a:p>
@@ -7528,7 +7542,7 @@
           <a:p>
             <a:fld id="{D088F999-7A4E-6B4F-9FED-EF75B73AD044}" type="datetimeFigureOut">
               <a:rPr lang="en-US" smtClean="0"/>
-              <a:t>7/13/2024</a:t>
+              <a:t>8/7/2024</a:t>
             </a:fld>
             <a:endParaRPr lang="en-US"/>
           </a:p>
@@ -7780,7 +7794,7 @@
           <a:p>
             <a:fld id="{D088F999-7A4E-6B4F-9FED-EF75B73AD044}" type="datetimeFigureOut">
               <a:rPr lang="en-US" smtClean="0"/>
-              <a:t>7/13/2024</a:t>
+              <a:t>8/7/2024</a:t>
             </a:fld>
             <a:endParaRPr lang="en-US"/>
           </a:p>
@@ -8000,7 +8014,7 @@
           <a:p>
             <a:fld id="{D088F999-7A4E-6B4F-9FED-EF75B73AD044}" type="datetimeFigureOut">
               <a:rPr lang="en-US" smtClean="0"/>
-              <a:t>7/13/2024</a:t>
+              <a:t>8/7/2024</a:t>
             </a:fld>
             <a:endParaRPr lang="en-US"/>
           </a:p>
@@ -8517,7 +8531,7 @@
           <a:p>
             <a:fld id="{D088F999-7A4E-6B4F-9FED-EF75B73AD044}" type="datetimeFigureOut">
               <a:rPr lang="en-US" smtClean="0"/>
-              <a:t>7/13/2024</a:t>
+              <a:t>8/7/2024</a:t>
             </a:fld>
             <a:endParaRPr lang="en-US"/>
           </a:p>
@@ -9552,7 +9566,7 @@
         <p:spPr/>
         <p:txBody>
           <a:bodyPr>
-            <a:normAutofit lnSpcReduction="10000"/>
+            <a:normAutofit/>
           </a:bodyPr>
           <a:lstStyle/>
           <a:p>
@@ -9577,12 +9591,6 @@
             <a:r>
               <a:rPr lang="en-US" dirty="0"/>
               <a:t>Contribute to Learn entirely in the browser</a:t>
-            </a:r>
-          </a:p>
-          <a:p>
-            <a:r>
-              <a:rPr lang="en-US" dirty="0"/>
-              <a:t>Docs as Code</a:t>
             </a:r>
           </a:p>
           <a:p>
@@ -11529,6 +11537,13 @@
             <a:r>
               <a:rPr lang="en-US" dirty="0"/>
               <a:t> </a:t>
+            </a:r>
+          </a:p>
+          <a:p>
+            <a:pPr lvl="1"/>
+            <a:r>
+              <a:rPr lang="en-US" dirty="0"/>
+              <a:t>Meet me at the Visual Studio &amp; .NET reception this afternoon</a:t>
             </a:r>
           </a:p>
         </p:txBody>
@@ -13791,4 +13806,10 @@
   <a:objectDefaults/>
   <a:extraClrSchemeLst/>
 </a:theme>
+</file>
+
+<file path=docMetadata/LabelInfo.xml><?xml version="1.0" encoding="utf-8"?>
+<clbl:labelList xmlns:clbl="http://schemas.microsoft.com/office/2020/mipLabelMetadata">
+  <clbl:label id="{f42aa342-8706-4288-bd11-ebb85995028c}" enabled="1" method="Standard" siteId="{72f988bf-86f1-41af-91ab-2d7cd011db47}" contentBits="0" removed="0"/>
+</clbl:labelList>
 </file>
</xml_diff>

<commit_message>
Slide deck updates for Learn at vslive mshq
</commit_message>
<xml_diff>
--- a/2024/0806_VSLiveRedmond/ContributeToMsLearn/VSLMSHQ24_Become a MS Learn Contributor_AlvinAshcraft.pptx
+++ b/2024/0806_VSLiveRedmond/ContributeToMsLearn/VSLMSHQ24_Become a MS Learn Contributor_AlvinAshcraft.pptx
@@ -612,21 +612,7 @@
                 <a:latin typeface="Calibri"/>
                 <a:cs typeface="Calibri"/>
               </a:rPr>
-              <a:t>Welcome to this </a:t>
-            </a:r>
-            <a:r>
-              <a:rPr lang="en-US" sz="1200">
-                <a:latin typeface="Calibri"/>
-                <a:cs typeface="Calibri"/>
-              </a:rPr>
-              <a:t>Fast Focus </a:t>
-            </a:r>
-            <a:r>
-              <a:rPr lang="en-US" sz="1200" dirty="0">
-                <a:latin typeface="Calibri"/>
-                <a:cs typeface="Calibri"/>
-              </a:rPr>
-              <a:t>session on contributing to the documentation on Microsoft Learn.</a:t>
+              <a:t>Welcome to this Fast Focus session on contributing to the documentation on Microsoft Learn.</a:t>
             </a:r>
           </a:p>
           <a:p>
@@ -4233,6 +4219,15 @@
           <a:p>
             <a:endParaRPr lang="en-US" dirty="0"/>
           </a:p>
+          <a:p>
+            <a:r>
+              <a:rPr lang="en-US" dirty="0"/>
+              <a:t>There are also sections for Credentials, Code Samples, Assessments, and Shows.</a:t>
+            </a:r>
+          </a:p>
+          <a:p>
+            <a:endParaRPr lang="en-US" dirty="0"/>
+          </a:p>
         </p:txBody>
       </p:sp>
     </p:spTree>
@@ -4323,6 +4318,27 @@
                 <a:cs typeface="Segoe UI"/>
               </a:rPr>
               <a:t>Through Learn, we provide access to documentation, samples, and training, and we foster community interaction through Q&amp;A. We accept bugs, suggestions, and feedback, and we want to connect with you.</a:t>
+            </a:r>
+          </a:p>
+          <a:p>
+            <a:pPr defTabSz="914400">
+              <a:defRPr/>
+            </a:pPr>
+            <a:endParaRPr lang="en-US" sz="1200" dirty="0">
+              <a:latin typeface="Segoe UI"/>
+              <a:cs typeface="Segoe UI"/>
+            </a:endParaRPr>
+          </a:p>
+          <a:p>
+            <a:pPr defTabSz="914400">
+              <a:defRPr/>
+            </a:pPr>
+            <a:r>
+              <a:rPr lang="en-US" sz="1200" dirty="0">
+                <a:latin typeface="Segoe UI"/>
+                <a:cs typeface="Segoe UI"/>
+              </a:rPr>
+              <a:t>Our content developers have a mix of expertise. Most have a technical background, but some have come from a background in writing or education.</a:t>
             </a:r>
           </a:p>
           <a:p>
@@ -9661,7 +9677,7 @@
           <a:p>
             <a:r>
               <a:rPr lang="en-US" dirty="0"/>
-              <a:t>What Belongs in Issues &amp; PRs</a:t>
+              <a:t>What Belongs in Learn Issues &amp; PRs</a:t>
             </a:r>
           </a:p>
         </p:txBody>
@@ -9691,7 +9707,7 @@
           <a:p>
             <a:r>
               <a:rPr lang="en-US" dirty="0"/>
-              <a:t>For support issues, contact Support or partner.</a:t>
+              <a:t>For product support issues, contact Support or partner.</a:t>
             </a:r>
           </a:p>
           <a:p>
@@ -10288,7 +10304,12 @@
             <p:ph type="title"/>
           </p:nvPr>
         </p:nvSpPr>
-        <p:spPr/>
+        <p:spPr>
+          <a:xfrm>
+            <a:off x="457200" y="133350"/>
+            <a:ext cx="8229600" cy="762000"/>
+          </a:xfrm>
+        </p:spPr>
         <p:txBody>
           <a:bodyPr>
             <a:normAutofit fontScale="90000"/>
@@ -10318,7 +10339,12 @@
             <p:ph idx="1"/>
           </p:nvPr>
         </p:nvSpPr>
-        <p:spPr/>
+        <p:spPr>
+          <a:xfrm>
+            <a:off x="457200" y="971550"/>
+            <a:ext cx="8229600" cy="3810000"/>
+          </a:xfrm>
+        </p:spPr>
         <p:txBody>
           <a:bodyPr>
             <a:normAutofit fontScale="77500" lnSpcReduction="20000"/>
@@ -10363,17 +10389,27 @@
           <a:p>
             <a:r>
               <a:rPr lang="en-US" dirty="0"/>
-              <a:t>Above all, be simple and human.</a:t>
-            </a:r>
-          </a:p>
-          <a:p>
-            <a:r>
-              <a:rPr lang="en-US" dirty="0"/>
-              <a:t>Get Help - </a:t>
+              <a:t>Above all, be simple and human - </a:t>
             </a:r>
             <a:r>
               <a:rPr lang="en-US" dirty="0">
                 <a:hlinkClick r:id="rId3"/>
+              </a:rPr>
+              <a:t>https://learn.microsoft.com/style-guide/welcome/</a:t>
+            </a:r>
+            <a:r>
+              <a:rPr lang="en-US" dirty="0"/>
+              <a:t> </a:t>
+            </a:r>
+          </a:p>
+          <a:p>
+            <a:r>
+              <a:rPr lang="en-US" dirty="0"/>
+              <a:t>Get Help - </a:t>
+            </a:r>
+            <a:r>
+              <a:rPr lang="en-US" dirty="0">
+                <a:hlinkClick r:id="rId4"/>
               </a:rPr>
               <a:t>https://learn.microsoft.com/Contribute/content/</a:t>
             </a:r>
@@ -11997,7 +12033,7 @@
           <a:p>
             <a:r>
               <a:rPr lang="en-US" dirty="0"/>
-              <a:t>Learn tips &amp; tricks</a:t>
+              <a:t>Learn tips &amp; tricks for using Learn</a:t>
             </a:r>
           </a:p>
           <a:p>
@@ -12010,13 +12046,13 @@
             <a:pPr lvl="1"/>
             <a:r>
               <a:rPr lang="en-US" dirty="0"/>
-              <a:t>Learn Documentation is Open Source</a:t>
-            </a:r>
-          </a:p>
-          <a:p>
-            <a:r>
-              <a:rPr lang="en-US" dirty="0"/>
-              <a:t>How to Contribute</a:t>
+              <a:t>Learn documentation is open source</a:t>
+            </a:r>
+          </a:p>
+          <a:p>
+            <a:r>
+              <a:rPr lang="en-US" dirty="0"/>
+              <a:t>How to contribute</a:t>
             </a:r>
           </a:p>
           <a:p>
@@ -12123,7 +12159,9 @@
         </p:nvSpPr>
         <p:spPr/>
         <p:txBody>
-          <a:bodyPr/>
+          <a:bodyPr>
+            <a:normAutofit fontScale="92500"/>
+          </a:bodyPr>
           <a:lstStyle/>
           <a:p>
             <a:r>
@@ -12168,9 +12206,12 @@
               </a:rPr>
               <a:t>https://learn.microsoft.com/answers</a:t>
             </a:r>
-            <a:r>
-              <a:rPr lang="en-US" dirty="0"/>
-              <a:t> </a:t>
+            <a:endParaRPr lang="en-US" dirty="0"/>
+          </a:p>
+          <a:p>
+            <a:r>
+              <a:rPr lang="en-US" dirty="0"/>
+              <a:t>Credentials, Code samples, Assessments, Shows </a:t>
             </a:r>
           </a:p>
         </p:txBody>

</xml_diff>